<commit_message>
Update Generative AI content
</commit_message>
<xml_diff>
--- a/files/CS373/GenerativeAITools/GenerativeAITools.pptx
+++ b/files/CS373/GenerativeAITools/GenerativeAITools.pptx
@@ -19,6 +19,10 @@
     <p:sldId id="267" r:id="rId13"/>
     <p:sldId id="268" r:id="rId14"/>
     <p:sldId id="269" r:id="rId15"/>
+    <p:sldId id="270" r:id="rId16"/>
+    <p:sldId id="273" r:id="rId17"/>
+    <p:sldId id="271" r:id="rId18"/>
+    <p:sldId id="272" r:id="rId19"/>
   </p:sldIdLst>
   <p:sldSz cx="12192000" cy="6858000"/>
   <p:notesSz cx="6858000" cy="9144000"/>
@@ -18058,6 +18062,899 @@
 </p:sld>
 </file>
 
+<file path=ppt/slides/slide15.xml><?xml version="1.0" encoding="utf-8"?>
+<p:sld xmlns:a="http://schemas.openxmlformats.org/drawingml/2006/main" xmlns:r="http://schemas.openxmlformats.org/officeDocument/2006/relationships" xmlns:p="http://schemas.openxmlformats.org/presentationml/2006/main">
+  <p:cSld>
+    <p:spTree>
+      <p:nvGrpSpPr>
+        <p:cNvPr id="1" name=""/>
+        <p:cNvGrpSpPr/>
+        <p:nvPr/>
+      </p:nvGrpSpPr>
+      <p:grpSpPr>
+        <a:xfrm>
+          <a:off x="0" y="0"/>
+          <a:ext cx="0" cy="0"/>
+          <a:chOff x="0" y="0"/>
+          <a:chExt cx="0" cy="0"/>
+        </a:xfrm>
+      </p:grpSpPr>
+      <p:sp>
+        <p:nvSpPr>
+          <p:cNvPr id="4" name="TextBox 3">
+            <a:extLst>
+              <a:ext uri="{FF2B5EF4-FFF2-40B4-BE49-F238E27FC236}">
+                <a16:creationId xmlns:a16="http://schemas.microsoft.com/office/drawing/2014/main" id="{42287721-8804-B668-7025-3BCA2C8D65C8}"/>
+              </a:ext>
+            </a:extLst>
+          </p:cNvPr>
+          <p:cNvSpPr txBox="1"/>
+          <p:nvPr/>
+        </p:nvSpPr>
+        <p:spPr>
+          <a:xfrm>
+            <a:off x="8196379" y="0"/>
+            <a:ext cx="3995621" cy="923330"/>
+          </a:xfrm>
+          <a:prstGeom prst="rect">
+            <a:avLst/>
+          </a:prstGeom>
+        </p:spPr>
+        <p:style>
+          <a:lnRef idx="2">
+            <a:schemeClr val="dk1"/>
+          </a:lnRef>
+          <a:fillRef idx="1">
+            <a:schemeClr val="lt1"/>
+          </a:fillRef>
+          <a:effectRef idx="0">
+            <a:schemeClr val="dk1"/>
+          </a:effectRef>
+          <a:fontRef idx="minor">
+            <a:schemeClr val="dk1"/>
+          </a:fontRef>
+        </p:style>
+        <p:txBody>
+          <a:bodyPr wrap="square" rtlCol="0">
+            <a:spAutoFit/>
+          </a:bodyPr>
+          <a:lstStyle/>
+          <a:p>
+            <a:pPr algn="ctr"/>
+            <a:r>
+              <a:rPr lang="en-US" dirty="0" err="1"/>
+              <a:t>OpenAI</a:t>
+            </a:r>
+            <a:r>
+              <a:rPr lang="en-US" dirty="0"/>
+              <a:t> Playground</a:t>
+            </a:r>
+          </a:p>
+          <a:p>
+            <a:pPr algn="ctr"/>
+            <a:r>
+              <a:rPr lang="en-US" dirty="0" err="1"/>
+              <a:t>BibTeX</a:t>
+            </a:r>
+            <a:r>
+              <a:rPr lang="en-US" dirty="0"/>
+              <a:t> citations</a:t>
+            </a:r>
+          </a:p>
+          <a:p>
+            <a:pPr algn="ctr"/>
+            <a:r>
+              <a:rPr lang="en-US" dirty="0"/>
+              <a:t>Convert from MLA-style format</a:t>
+            </a:r>
+          </a:p>
+        </p:txBody>
+      </p:sp>
+      <p:pic>
+        <p:nvPicPr>
+          <p:cNvPr id="5" name="Picture 4" descr="Graphical user interface, text, application, email&#10;&#10;Description automatically generated">
+            <a:extLst>
+              <a:ext uri="{FF2B5EF4-FFF2-40B4-BE49-F238E27FC236}">
+                <a16:creationId xmlns:a16="http://schemas.microsoft.com/office/drawing/2014/main" id="{CEB3300C-19E3-F14F-E9F0-5DB5E3DE7763}"/>
+              </a:ext>
+            </a:extLst>
+          </p:cNvPr>
+          <p:cNvPicPr>
+            <a:picLocks noChangeAspect="1"/>
+          </p:cNvPicPr>
+          <p:nvPr/>
+        </p:nvPicPr>
+        <p:blipFill>
+          <a:blip r:embed="rId2"/>
+          <a:stretch>
+            <a:fillRect/>
+          </a:stretch>
+        </p:blipFill>
+        <p:spPr>
+          <a:xfrm>
+            <a:off x="242370" y="882059"/>
+            <a:ext cx="11752415" cy="4251801"/>
+          </a:xfrm>
+          <a:prstGeom prst="rect">
+            <a:avLst/>
+          </a:prstGeom>
+        </p:spPr>
+      </p:pic>
+    </p:spTree>
+    <p:extLst>
+      <p:ext uri="{BB962C8B-B14F-4D97-AF65-F5344CB8AC3E}">
+        <p14:creationId xmlns:p14="http://schemas.microsoft.com/office/powerpoint/2010/main" val="4150575577"/>
+      </p:ext>
+    </p:extLst>
+  </p:cSld>
+  <p:clrMapOvr>
+    <a:masterClrMapping/>
+  </p:clrMapOvr>
+</p:sld>
+</file>
+
+<file path=ppt/slides/slide16.xml><?xml version="1.0" encoding="utf-8"?>
+<p:sld xmlns:a="http://schemas.openxmlformats.org/drawingml/2006/main" xmlns:r="http://schemas.openxmlformats.org/officeDocument/2006/relationships" xmlns:p="http://schemas.openxmlformats.org/presentationml/2006/main">
+  <p:cSld>
+    <p:spTree>
+      <p:nvGrpSpPr>
+        <p:cNvPr id="1" name=""/>
+        <p:cNvGrpSpPr/>
+        <p:nvPr/>
+      </p:nvGrpSpPr>
+      <p:grpSpPr>
+        <a:xfrm>
+          <a:off x="0" y="0"/>
+          <a:ext cx="0" cy="0"/>
+          <a:chOff x="0" y="0"/>
+          <a:chExt cx="0" cy="0"/>
+        </a:xfrm>
+      </p:grpSpPr>
+      <p:sp>
+        <p:nvSpPr>
+          <p:cNvPr id="4" name="TextBox 3">
+            <a:extLst>
+              <a:ext uri="{FF2B5EF4-FFF2-40B4-BE49-F238E27FC236}">
+                <a16:creationId xmlns:a16="http://schemas.microsoft.com/office/drawing/2014/main" id="{42287721-8804-B668-7025-3BCA2C8D65C8}"/>
+              </a:ext>
+            </a:extLst>
+          </p:cNvPr>
+          <p:cNvSpPr txBox="1"/>
+          <p:nvPr/>
+        </p:nvSpPr>
+        <p:spPr>
+          <a:xfrm>
+            <a:off x="8196379" y="0"/>
+            <a:ext cx="3995621" cy="923330"/>
+          </a:xfrm>
+          <a:prstGeom prst="rect">
+            <a:avLst/>
+          </a:prstGeom>
+        </p:spPr>
+        <p:style>
+          <a:lnRef idx="2">
+            <a:schemeClr val="dk1"/>
+          </a:lnRef>
+          <a:fillRef idx="1">
+            <a:schemeClr val="lt1"/>
+          </a:fillRef>
+          <a:effectRef idx="0">
+            <a:schemeClr val="dk1"/>
+          </a:effectRef>
+          <a:fontRef idx="minor">
+            <a:schemeClr val="dk1"/>
+          </a:fontRef>
+        </p:style>
+        <p:txBody>
+          <a:bodyPr wrap="square" rtlCol="0">
+            <a:spAutoFit/>
+          </a:bodyPr>
+          <a:lstStyle/>
+          <a:p>
+            <a:pPr algn="ctr"/>
+            <a:r>
+              <a:rPr lang="en-US" dirty="0" err="1"/>
+              <a:t>OpenAI</a:t>
+            </a:r>
+            <a:r>
+              <a:rPr lang="en-US" dirty="0"/>
+              <a:t> Playground</a:t>
+            </a:r>
+          </a:p>
+          <a:p>
+            <a:pPr algn="ctr"/>
+            <a:r>
+              <a:rPr lang="en-US" dirty="0" err="1"/>
+              <a:t>BibTeX</a:t>
+            </a:r>
+            <a:r>
+              <a:rPr lang="en-US" dirty="0"/>
+              <a:t> citations</a:t>
+            </a:r>
+          </a:p>
+          <a:p>
+            <a:pPr algn="ctr"/>
+            <a:r>
+              <a:rPr lang="en-US" dirty="0"/>
+              <a:t>To </a:t>
+            </a:r>
+            <a:r>
+              <a:rPr lang="en-US" dirty="0" err="1"/>
+              <a:t>BibTeX</a:t>
+            </a:r>
+            <a:r>
+              <a:rPr lang="en-US" dirty="0"/>
+              <a:t> database format</a:t>
+            </a:r>
+          </a:p>
+        </p:txBody>
+      </p:sp>
+      <p:pic>
+        <p:nvPicPr>
+          <p:cNvPr id="3" name="Picture 2" descr="Graphical user interface, text, application&#10;&#10;Description automatically generated">
+            <a:extLst>
+              <a:ext uri="{FF2B5EF4-FFF2-40B4-BE49-F238E27FC236}">
+                <a16:creationId xmlns:a16="http://schemas.microsoft.com/office/drawing/2014/main" id="{8408E06C-8DAC-0F55-1E4E-B42B8BC5E644}"/>
+              </a:ext>
+            </a:extLst>
+          </p:cNvPr>
+          <p:cNvPicPr>
+            <a:picLocks noChangeAspect="1"/>
+          </p:cNvPicPr>
+          <p:nvPr/>
+        </p:nvPicPr>
+        <p:blipFill rotWithShape="1">
+          <a:blip r:embed="rId2"/>
+          <a:srcRect b="36867"/>
+          <a:stretch/>
+        </p:blipFill>
+        <p:spPr>
+          <a:xfrm>
+            <a:off x="251727" y="0"/>
+            <a:ext cx="5818386" cy="6334699"/>
+          </a:xfrm>
+          <a:prstGeom prst="rect">
+            <a:avLst/>
+          </a:prstGeom>
+        </p:spPr>
+      </p:pic>
+      <p:pic>
+        <p:nvPicPr>
+          <p:cNvPr id="6" name="Picture 5" descr="Graphical user interface, text, application&#10;&#10;Description automatically generated">
+            <a:extLst>
+              <a:ext uri="{FF2B5EF4-FFF2-40B4-BE49-F238E27FC236}">
+                <a16:creationId xmlns:a16="http://schemas.microsoft.com/office/drawing/2014/main" id="{EA463D02-3A89-E403-C076-4D74D5684B30}"/>
+              </a:ext>
+            </a:extLst>
+          </p:cNvPr>
+          <p:cNvPicPr>
+            <a:picLocks noChangeAspect="1"/>
+          </p:cNvPicPr>
+          <p:nvPr/>
+        </p:nvPicPr>
+        <p:blipFill rotWithShape="1">
+          <a:blip r:embed="rId2"/>
+          <a:srcRect t="63133"/>
+          <a:stretch/>
+        </p:blipFill>
+        <p:spPr>
+          <a:xfrm>
+            <a:off x="6134393" y="1663548"/>
+            <a:ext cx="5934785" cy="3773276"/>
+          </a:xfrm>
+          <a:prstGeom prst="rect">
+            <a:avLst/>
+          </a:prstGeom>
+        </p:spPr>
+      </p:pic>
+    </p:spTree>
+    <p:extLst>
+      <p:ext uri="{BB962C8B-B14F-4D97-AF65-F5344CB8AC3E}">
+        <p14:creationId xmlns:p14="http://schemas.microsoft.com/office/powerpoint/2010/main" val="3849133777"/>
+      </p:ext>
+    </p:extLst>
+  </p:cSld>
+  <p:clrMapOvr>
+    <a:masterClrMapping/>
+  </p:clrMapOvr>
+</p:sld>
+</file>
+
+<file path=ppt/slides/slide17.xml><?xml version="1.0" encoding="utf-8"?>
+<p:sld xmlns:a="http://schemas.openxmlformats.org/drawingml/2006/main" xmlns:r="http://schemas.openxmlformats.org/officeDocument/2006/relationships" xmlns:p="http://schemas.openxmlformats.org/presentationml/2006/main">
+  <p:cSld>
+    <p:spTree>
+      <p:nvGrpSpPr>
+        <p:cNvPr id="1" name=""/>
+        <p:cNvGrpSpPr/>
+        <p:nvPr/>
+      </p:nvGrpSpPr>
+      <p:grpSpPr>
+        <a:xfrm>
+          <a:off x="0" y="0"/>
+          <a:ext cx="0" cy="0"/>
+          <a:chOff x="0" y="0"/>
+          <a:chExt cx="0" cy="0"/>
+        </a:xfrm>
+      </p:grpSpPr>
+      <p:sp>
+        <p:nvSpPr>
+          <p:cNvPr id="4" name="TextBox 3">
+            <a:extLst>
+              <a:ext uri="{FF2B5EF4-FFF2-40B4-BE49-F238E27FC236}">
+                <a16:creationId xmlns:a16="http://schemas.microsoft.com/office/drawing/2014/main" id="{42287721-8804-B668-7025-3BCA2C8D65C8}"/>
+              </a:ext>
+            </a:extLst>
+          </p:cNvPr>
+          <p:cNvSpPr txBox="1"/>
+          <p:nvPr/>
+        </p:nvSpPr>
+        <p:spPr>
+          <a:xfrm>
+            <a:off x="8196379" y="0"/>
+            <a:ext cx="3995621" cy="646331"/>
+          </a:xfrm>
+          <a:prstGeom prst="rect">
+            <a:avLst/>
+          </a:prstGeom>
+        </p:spPr>
+        <p:style>
+          <a:lnRef idx="2">
+            <a:schemeClr val="dk1"/>
+          </a:lnRef>
+          <a:fillRef idx="1">
+            <a:schemeClr val="lt1"/>
+          </a:fillRef>
+          <a:effectRef idx="0">
+            <a:schemeClr val="dk1"/>
+          </a:effectRef>
+          <a:fontRef idx="minor">
+            <a:schemeClr val="dk1"/>
+          </a:fontRef>
+        </p:style>
+        <p:txBody>
+          <a:bodyPr wrap="square" rtlCol="0">
+            <a:spAutoFit/>
+          </a:bodyPr>
+          <a:lstStyle/>
+          <a:p>
+            <a:pPr algn="ctr"/>
+            <a:r>
+              <a:rPr lang="en-US" dirty="0" err="1"/>
+              <a:t>OpenAI</a:t>
+            </a:r>
+            <a:r>
+              <a:rPr lang="en-US" dirty="0"/>
+              <a:t> Playground</a:t>
+            </a:r>
+          </a:p>
+          <a:p>
+            <a:pPr algn="ctr"/>
+            <a:r>
+              <a:rPr lang="en-US" dirty="0" err="1"/>
+              <a:t>Tl;dr</a:t>
+            </a:r>
+            <a:r>
+              <a:rPr lang="en-US" dirty="0"/>
+              <a:t> assistant</a:t>
+            </a:r>
+          </a:p>
+        </p:txBody>
+      </p:sp>
+      <p:sp>
+        <p:nvSpPr>
+          <p:cNvPr id="2" name="TextBox 1">
+            <a:extLst>
+              <a:ext uri="{FF2B5EF4-FFF2-40B4-BE49-F238E27FC236}">
+                <a16:creationId xmlns:a16="http://schemas.microsoft.com/office/drawing/2014/main" id="{5FFBAA21-E3B3-1B21-7D52-414D3259F487}"/>
+              </a:ext>
+            </a:extLst>
+          </p:cNvPr>
+          <p:cNvSpPr txBox="1"/>
+          <p:nvPr/>
+        </p:nvSpPr>
+        <p:spPr>
+          <a:xfrm>
+            <a:off x="121325" y="1229846"/>
+            <a:ext cx="11754858" cy="5262979"/>
+          </a:xfrm>
+          <a:prstGeom prst="rect">
+            <a:avLst/>
+          </a:prstGeom>
+          <a:noFill/>
+        </p:spPr>
+        <p:txBody>
+          <a:bodyPr wrap="square" rtlCol="0">
+            <a:spAutoFit/>
+          </a:bodyPr>
+          <a:lstStyle/>
+          <a:p>
+            <a:pPr marL="0" marR="0" algn="l">
+              <a:spcBef>
+                <a:spcPts val="0"/>
+              </a:spcBef>
+              <a:spcAft>
+                <a:spcPts val="0"/>
+              </a:spcAft>
+            </a:pPr>
+            <a:r>
+              <a:rPr lang="en-US" sz="1600" b="0" i="0" dirty="0">
+                <a:solidFill>
+                  <a:srgbClr val="000000"/>
+                </a:solidFill>
+                <a:effectLst/>
+                <a:latin typeface="Calibri" panose="020F0502020204030204" pitchFamily="34" charset="0"/>
+              </a:rPr>
+              <a:t>Original text:</a:t>
+            </a:r>
+            <a:br>
+              <a:rPr lang="en-US" sz="1600" dirty="0"/>
+            </a:br>
+            <a:br>
+              <a:rPr lang="en-US" sz="1600" dirty="0"/>
+            </a:br>
+            <a:r>
+              <a:rPr lang="en-US" sz="1600" b="0" i="0" dirty="0">
+                <a:solidFill>
+                  <a:srgbClr val="000000"/>
+                </a:solidFill>
+                <a:effectLst/>
+                <a:latin typeface="Calibri" panose="020F0502020204030204" pitchFamily="34" charset="0"/>
+              </a:rPr>
+              <a:t>We seek to gain improved insight into how Web search engines should cope with the evolving Web, in an attempt to provide users with the most up-to-date results possible. For this purpose we collected weekly snapshots of some 150 Web sites over the course of one year, and measured the evolution of content and link structure. Our measurements focus on aspects of potential interest to search engine designers: the evolution of link structure over time, the rate of creation of new pages and new distinct content on the Web, and the rate of change of the content of existing pages under search-centric measures of degree of change. Our findings indicate a rapid turnover rate of Web pages, i.e., high rates of birth and death, coupled with an even higher rate of turnover in the hyperlinks that connect them. For pages that persist over time we found that, perhaps surprisingly, the degree of content shift as measured using TF.IDF cosine distance does not appear to be consistently correlated with the frequency of content updating. Despite this apparent non-correlation, the rate of content shift of a given page is likely to remain consistent over time. That is, pages that change a great deal in one week will likely change by a similarly large degree in the following week. Conversely, pages that experience little change will continue to experience little change. We conclude the paper with a discussion of the potential implications of our results for the design of effective Web search engines.</a:t>
+            </a:r>
+            <a:br>
+              <a:rPr lang="en-US" sz="1600" b="0" i="0" dirty="0">
+                <a:solidFill>
+                  <a:srgbClr val="000000"/>
+                </a:solidFill>
+                <a:effectLst/>
+                <a:latin typeface="Calibri" panose="020F0502020204030204" pitchFamily="34" charset="0"/>
+              </a:rPr>
+            </a:br>
+            <a:br>
+              <a:rPr lang="en-US" sz="1600" dirty="0"/>
+            </a:br>
+            <a:r>
+              <a:rPr lang="en-US" sz="1600" b="0" i="0" dirty="0" err="1">
+                <a:solidFill>
+                  <a:srgbClr val="000000"/>
+                </a:solidFill>
+                <a:effectLst/>
+                <a:latin typeface="Calibri" panose="020F0502020204030204" pitchFamily="34" charset="0"/>
+              </a:rPr>
+              <a:t>Tl;dr</a:t>
+            </a:r>
+            <a:r>
+              <a:rPr lang="en-US" sz="1600" b="0" i="0" dirty="0">
+                <a:solidFill>
+                  <a:srgbClr val="000000"/>
+                </a:solidFill>
+                <a:effectLst/>
+                <a:latin typeface="Calibri" panose="020F0502020204030204" pitchFamily="34" charset="0"/>
+              </a:rPr>
+              <a:t> version</a:t>
+            </a:r>
+            <a:br>
+              <a:rPr lang="en-US" sz="1600" dirty="0"/>
+            </a:br>
+            <a:br>
+              <a:rPr lang="en-US" sz="1600" dirty="0"/>
+            </a:br>
+            <a:r>
+              <a:rPr lang="en-US" sz="1600" b="0" i="0" dirty="0">
+                <a:solidFill>
+                  <a:srgbClr val="000000"/>
+                </a:solidFill>
+                <a:effectLst/>
+                <a:latin typeface="Calibri" panose="020F0502020204030204" pitchFamily="34" charset="0"/>
+              </a:rPr>
+              <a:t>The Web is constantly evolving, with new pages being created and old ones being deleted or modified. Search engines need to be able to cope with this changing landscape in order to provide users with the most up-to-date results possible. Our study found that the rate of change of Web content is much higher than the rate of change of the links that connect it. This means that search engines need to be able to adapt quickly to changes in the content of Web pages, in order to provide the most relevant and up-to-date results.</a:t>
+            </a:r>
+            <a:br>
+              <a:rPr lang="en-US" sz="1600" dirty="0"/>
+            </a:br>
+            <a:endParaRPr lang="en-US" sz="1600" dirty="0"/>
+          </a:p>
+        </p:txBody>
+      </p:sp>
+      <p:sp>
+        <p:nvSpPr>
+          <p:cNvPr id="3" name="TextBox 2">
+            <a:extLst>
+              <a:ext uri="{FF2B5EF4-FFF2-40B4-BE49-F238E27FC236}">
+                <a16:creationId xmlns:a16="http://schemas.microsoft.com/office/drawing/2014/main" id="{AB52C2C1-46F2-656A-9395-FB80FC6CB97B}"/>
+              </a:ext>
+            </a:extLst>
+          </p:cNvPr>
+          <p:cNvSpPr txBox="1"/>
+          <p:nvPr/>
+        </p:nvSpPr>
+        <p:spPr>
+          <a:xfrm>
+            <a:off x="121325" y="217236"/>
+            <a:ext cx="6874386" cy="923330"/>
+          </a:xfrm>
+          <a:prstGeom prst="rect">
+            <a:avLst/>
+          </a:prstGeom>
+          <a:noFill/>
+        </p:spPr>
+        <p:txBody>
+          <a:bodyPr wrap="square" rtlCol="0">
+            <a:spAutoFit/>
+          </a:bodyPr>
+          <a:lstStyle/>
+          <a:p>
+            <a:r>
+              <a:rPr lang="en-US" b="0" i="0" dirty="0" err="1">
+                <a:solidFill>
+                  <a:srgbClr val="000000"/>
+                </a:solidFill>
+                <a:effectLst/>
+                <a:latin typeface="Calibri" panose="020F0502020204030204" pitchFamily="34" charset="0"/>
+              </a:rPr>
+              <a:t>Tl;dr</a:t>
+            </a:r>
+            <a:r>
+              <a:rPr lang="en-US" b="0" i="0" dirty="0">
+                <a:solidFill>
+                  <a:srgbClr val="000000"/>
+                </a:solidFill>
+                <a:effectLst/>
+                <a:latin typeface="Calibri" panose="020F0502020204030204" pitchFamily="34" charset="0"/>
+              </a:rPr>
+              <a:t>. Here is a WWW’04 conference paper abstract I use in a compact writing exercise, followed by the AI-generated </a:t>
+            </a:r>
+            <a:r>
+              <a:rPr lang="en-US" b="0" i="0" dirty="0" err="1">
+                <a:solidFill>
+                  <a:srgbClr val="000000"/>
+                </a:solidFill>
+                <a:effectLst/>
+                <a:latin typeface="Calibri" panose="020F0502020204030204" pitchFamily="34" charset="0"/>
+              </a:rPr>
+              <a:t>Tl;dr</a:t>
+            </a:r>
+            <a:r>
+              <a:rPr lang="en-US" b="0" i="0" dirty="0">
+                <a:solidFill>
+                  <a:srgbClr val="000000"/>
+                </a:solidFill>
+                <a:effectLst/>
+                <a:latin typeface="Calibri" panose="020F0502020204030204" pitchFamily="34" charset="0"/>
+              </a:rPr>
+              <a:t> version. I chose the abstract because it presents significant opportunities for improvement.</a:t>
+            </a:r>
+            <a:endParaRPr lang="en-US" dirty="0"/>
+          </a:p>
+        </p:txBody>
+      </p:sp>
+    </p:spTree>
+    <p:extLst>
+      <p:ext uri="{BB962C8B-B14F-4D97-AF65-F5344CB8AC3E}">
+        <p14:creationId xmlns:p14="http://schemas.microsoft.com/office/powerpoint/2010/main" val="335584738"/>
+      </p:ext>
+    </p:extLst>
+  </p:cSld>
+  <p:clrMapOvr>
+    <a:masterClrMapping/>
+  </p:clrMapOvr>
+</p:sld>
+</file>
+
+<file path=ppt/slides/slide18.xml><?xml version="1.0" encoding="utf-8"?>
+<p:sld xmlns:a="http://schemas.openxmlformats.org/drawingml/2006/main" xmlns:r="http://schemas.openxmlformats.org/officeDocument/2006/relationships" xmlns:p="http://schemas.openxmlformats.org/presentationml/2006/main">
+  <p:cSld>
+    <p:spTree>
+      <p:nvGrpSpPr>
+        <p:cNvPr id="1" name=""/>
+        <p:cNvGrpSpPr/>
+        <p:nvPr/>
+      </p:nvGrpSpPr>
+      <p:grpSpPr>
+        <a:xfrm>
+          <a:off x="0" y="0"/>
+          <a:ext cx="0" cy="0"/>
+          <a:chOff x="0" y="0"/>
+          <a:chExt cx="0" cy="0"/>
+        </a:xfrm>
+      </p:grpSpPr>
+      <p:sp>
+        <p:nvSpPr>
+          <p:cNvPr id="4" name="TextBox 3">
+            <a:extLst>
+              <a:ext uri="{FF2B5EF4-FFF2-40B4-BE49-F238E27FC236}">
+                <a16:creationId xmlns:a16="http://schemas.microsoft.com/office/drawing/2014/main" id="{42287721-8804-B668-7025-3BCA2C8D65C8}"/>
+              </a:ext>
+            </a:extLst>
+          </p:cNvPr>
+          <p:cNvSpPr txBox="1"/>
+          <p:nvPr/>
+        </p:nvSpPr>
+        <p:spPr>
+          <a:xfrm>
+            <a:off x="8196379" y="0"/>
+            <a:ext cx="3995621" cy="646331"/>
+          </a:xfrm>
+          <a:prstGeom prst="rect">
+            <a:avLst/>
+          </a:prstGeom>
+        </p:spPr>
+        <p:style>
+          <a:lnRef idx="2">
+            <a:schemeClr val="dk1"/>
+          </a:lnRef>
+          <a:fillRef idx="1">
+            <a:schemeClr val="lt1"/>
+          </a:fillRef>
+          <a:effectRef idx="0">
+            <a:schemeClr val="dk1"/>
+          </a:effectRef>
+          <a:fontRef idx="minor">
+            <a:schemeClr val="dk1"/>
+          </a:fontRef>
+        </p:style>
+        <p:txBody>
+          <a:bodyPr wrap="square" rtlCol="0">
+            <a:spAutoFit/>
+          </a:bodyPr>
+          <a:lstStyle/>
+          <a:p>
+            <a:pPr algn="ctr"/>
+            <a:r>
+              <a:rPr lang="en-US" dirty="0" err="1"/>
+              <a:t>OpenAI</a:t>
+            </a:r>
+            <a:r>
+              <a:rPr lang="en-US" dirty="0"/>
+              <a:t> Playground</a:t>
+            </a:r>
+          </a:p>
+          <a:p>
+            <a:pPr algn="ctr"/>
+            <a:r>
+              <a:rPr lang="en-US" dirty="0"/>
+              <a:t>Second-grader</a:t>
+            </a:r>
+          </a:p>
+        </p:txBody>
+      </p:sp>
+      <p:sp>
+        <p:nvSpPr>
+          <p:cNvPr id="2" name="TextBox 1">
+            <a:extLst>
+              <a:ext uri="{FF2B5EF4-FFF2-40B4-BE49-F238E27FC236}">
+                <a16:creationId xmlns:a16="http://schemas.microsoft.com/office/drawing/2014/main" id="{5FFBAA21-E3B3-1B21-7D52-414D3259F487}"/>
+              </a:ext>
+            </a:extLst>
+          </p:cNvPr>
+          <p:cNvSpPr txBox="1"/>
+          <p:nvPr/>
+        </p:nvSpPr>
+        <p:spPr>
+          <a:xfrm>
+            <a:off x="231494" y="1516284"/>
+            <a:ext cx="11754858" cy="4524315"/>
+          </a:xfrm>
+          <a:prstGeom prst="rect">
+            <a:avLst/>
+          </a:prstGeom>
+          <a:noFill/>
+        </p:spPr>
+        <p:txBody>
+          <a:bodyPr wrap="square" rtlCol="0">
+            <a:spAutoFit/>
+          </a:bodyPr>
+          <a:lstStyle/>
+          <a:p>
+            <a:pPr marL="0" marR="0" algn="l">
+              <a:spcBef>
+                <a:spcPts val="0"/>
+              </a:spcBef>
+              <a:spcAft>
+                <a:spcPts val="0"/>
+              </a:spcAft>
+            </a:pPr>
+            <a:r>
+              <a:rPr lang="en-US" sz="1800" b="0" i="0" dirty="0">
+                <a:solidFill>
+                  <a:srgbClr val="000000"/>
+                </a:solidFill>
+                <a:effectLst/>
+                <a:latin typeface="Calibri" panose="020F0502020204030204" pitchFamily="34" charset="0"/>
+              </a:rPr>
+              <a:t>Summarize this (my paragraph) for a second-grade student:</a:t>
+            </a:r>
+            <a:br>
+              <a:rPr lang="en-US" sz="1800" b="0" i="0" dirty="0">
+                <a:solidFill>
+                  <a:srgbClr val="000000"/>
+                </a:solidFill>
+                <a:effectLst/>
+                <a:latin typeface="Calibri" panose="020F0502020204030204" pitchFamily="34" charset="0"/>
+              </a:rPr>
+            </a:br>
+            <a:br>
+              <a:rPr lang="en-US" sz="1800" b="0" i="0" dirty="0">
+                <a:solidFill>
+                  <a:srgbClr val="000000"/>
+                </a:solidFill>
+                <a:effectLst/>
+                <a:latin typeface="Calibri" panose="020F0502020204030204" pitchFamily="34" charset="0"/>
+              </a:rPr>
+            </a:br>
+            <a:r>
+              <a:rPr lang="en-US" sz="1800" b="0" i="0" dirty="0">
+                <a:solidFill>
+                  <a:srgbClr val="000000"/>
+                </a:solidFill>
+                <a:effectLst/>
+                <a:latin typeface="Calibri" panose="020F0502020204030204" pitchFamily="34" charset="0"/>
+              </a:rPr>
+              <a:t>The demands of massive concurrency and increased resilience required for effective exascale computing have led to claims that our existing approach to application programming must be replaced. In this article I argue that disruption is inevitable, but from the programming perspective will not require new languages or programming environments. Instead the disruption will be in application architecture, introducing a new control layer that will provide the concurrency, adaptability and resilience features we need in order to achieve effective exascale performance levels.</a:t>
+            </a:r>
+            <a:br>
+              <a:rPr lang="en-US" sz="1800" b="0" i="0" dirty="0">
+                <a:solidFill>
+                  <a:srgbClr val="000000"/>
+                </a:solidFill>
+                <a:effectLst/>
+                <a:latin typeface="Calibri" panose="020F0502020204030204" pitchFamily="34" charset="0"/>
+              </a:rPr>
+            </a:br>
+            <a:br>
+              <a:rPr lang="en-US" sz="1800" b="0" i="0" dirty="0">
+                <a:solidFill>
+                  <a:srgbClr val="000000"/>
+                </a:solidFill>
+                <a:effectLst/>
+                <a:latin typeface="Calibri" panose="020F0502020204030204" pitchFamily="34" charset="0"/>
+              </a:rPr>
+            </a:br>
+            <a:r>
+              <a:rPr lang="en-US" dirty="0" err="1">
+                <a:solidFill>
+                  <a:srgbClr val="000000"/>
+                </a:solidFill>
+                <a:latin typeface="Calibri" panose="020F0502020204030204" pitchFamily="34" charset="0"/>
+              </a:rPr>
+              <a:t>OpenAI</a:t>
+            </a:r>
+            <a:r>
+              <a:rPr lang="en-US" dirty="0">
+                <a:solidFill>
+                  <a:srgbClr val="000000"/>
+                </a:solidFill>
+                <a:latin typeface="Calibri" panose="020F0502020204030204" pitchFamily="34" charset="0"/>
+              </a:rPr>
+              <a:t> Playground Generated </a:t>
+            </a:r>
+            <a:r>
+              <a:rPr lang="en-US" sz="1800" b="0" i="0" dirty="0">
+                <a:solidFill>
+                  <a:srgbClr val="000000"/>
+                </a:solidFill>
+                <a:effectLst/>
+                <a:latin typeface="Calibri" panose="020F0502020204030204" pitchFamily="34" charset="0"/>
+              </a:rPr>
+              <a:t>Second-grader text:</a:t>
+            </a:r>
+            <a:br>
+              <a:rPr lang="en-US" sz="1800" b="0" i="0" dirty="0">
+                <a:solidFill>
+                  <a:srgbClr val="000000"/>
+                </a:solidFill>
+                <a:effectLst/>
+                <a:latin typeface="Calibri" panose="020F0502020204030204" pitchFamily="34" charset="0"/>
+              </a:rPr>
+            </a:br>
+            <a:br>
+              <a:rPr lang="en-US" sz="1800" b="0" i="0" dirty="0">
+                <a:solidFill>
+                  <a:srgbClr val="000000"/>
+                </a:solidFill>
+                <a:effectLst/>
+                <a:latin typeface="Calibri" panose="020F0502020204030204" pitchFamily="34" charset="0"/>
+              </a:rPr>
+            </a:br>
+            <a:r>
+              <a:rPr lang="en-US" sz="1800" b="0" i="0" dirty="0">
+                <a:solidFill>
+                  <a:srgbClr val="000000"/>
+                </a:solidFill>
+                <a:effectLst/>
+                <a:latin typeface="Calibri" panose="020F0502020204030204" pitchFamily="34" charset="0"/>
+              </a:rPr>
+              <a:t>The article is discussing how the way we currently write programs will have to change in order to be effective at exascale computing. </a:t>
+            </a:r>
+            <a:r>
+              <a:rPr lang="en-US" sz="1800" b="0" i="0" dirty="0">
+                <a:solidFill>
+                  <a:srgbClr val="000000"/>
+                </a:solidFill>
+                <a:effectLst/>
+                <a:highlight>
+                  <a:srgbClr val="00FF00"/>
+                </a:highlight>
+                <a:latin typeface="Calibri" panose="020F0502020204030204" pitchFamily="34" charset="0"/>
+              </a:rPr>
+              <a:t>Exascale computing is a type of computing where programs can use a billion billion calculations per second. </a:t>
+            </a:r>
+            <a:r>
+              <a:rPr lang="en-US" sz="1800" b="0" i="0" dirty="0">
+                <a:solidFill>
+                  <a:srgbClr val="000000"/>
+                </a:solidFill>
+                <a:effectLst/>
+                <a:latin typeface="Calibri" panose="020F0502020204030204" pitchFamily="34" charset="0"/>
+              </a:rPr>
+              <a:t>This is different from our current approach, which the article claims will need to be replaced in order to be effective. The new way of writing programs will include a new control layer that provides features like concurrency, adaptability, and resilience. </a:t>
+            </a:r>
+          </a:p>
+          <a:p>
+            <a:br>
+              <a:rPr lang="en-US" dirty="0"/>
+            </a:br>
+            <a:endParaRPr lang="en-US" dirty="0"/>
+          </a:p>
+        </p:txBody>
+      </p:sp>
+      <p:sp>
+        <p:nvSpPr>
+          <p:cNvPr id="3" name="TextBox 2">
+            <a:extLst>
+              <a:ext uri="{FF2B5EF4-FFF2-40B4-BE49-F238E27FC236}">
+                <a16:creationId xmlns:a16="http://schemas.microsoft.com/office/drawing/2014/main" id="{AB52C2C1-46F2-656A-9395-FB80FC6CB97B}"/>
+              </a:ext>
+            </a:extLst>
+          </p:cNvPr>
+          <p:cNvSpPr txBox="1"/>
+          <p:nvPr/>
+        </p:nvSpPr>
+        <p:spPr>
+          <a:xfrm>
+            <a:off x="231494" y="850072"/>
+            <a:ext cx="9452472" cy="646331"/>
+          </a:xfrm>
+          <a:prstGeom prst="rect">
+            <a:avLst/>
+          </a:prstGeom>
+          <a:noFill/>
+        </p:spPr>
+        <p:txBody>
+          <a:bodyPr wrap="square" rtlCol="0">
+            <a:spAutoFit/>
+          </a:bodyPr>
+          <a:lstStyle/>
+          <a:p>
+            <a:r>
+              <a:rPr lang="en-US" b="0" i="0" dirty="0">
+                <a:solidFill>
+                  <a:srgbClr val="000000"/>
+                </a:solidFill>
+                <a:effectLst/>
+                <a:latin typeface="Calibri" panose="020F0502020204030204" pitchFamily="34" charset="0"/>
+              </a:rPr>
+              <a:t>Here is an opening paragraph for an article I wrote a few years ago, followed by the second-grader translation. Very interesting that the AI inserted the definition of exascale computing.</a:t>
+            </a:r>
+            <a:endParaRPr lang="en-US" dirty="0"/>
+          </a:p>
+        </p:txBody>
+      </p:sp>
+    </p:spTree>
+    <p:extLst>
+      <p:ext uri="{BB962C8B-B14F-4D97-AF65-F5344CB8AC3E}">
+        <p14:creationId xmlns:p14="http://schemas.microsoft.com/office/powerpoint/2010/main" val="533086613"/>
+      </p:ext>
+    </p:extLst>
+  </p:cSld>
+  <p:clrMapOvr>
+    <a:masterClrMapping/>
+  </p:clrMapOvr>
+</p:sld>
+</file>
+
 <file path=ppt/slides/slide2.xml><?xml version="1.0" encoding="utf-8"?>
 <p:sld xmlns:a="http://schemas.openxmlformats.org/drawingml/2006/main" xmlns:r="http://schemas.openxmlformats.org/officeDocument/2006/relationships" xmlns:p="http://schemas.openxmlformats.org/presentationml/2006/main">
   <p:cSld>

</xml_diff>